<commit_message>
feat: Add simple agent example workflow with chat trigger, AI agent, and tools for Gmail and Calendar
feat: Implement frontend for PDF uploader with drag-and-drop functionality and webhook integration

feat: Create a manual trigger and code node to generate fake tasks for testing purposes
</commit_message>
<xml_diff>
--- a/SessionOne/N8N Presentation.pptx
+++ b/SessionOne/N8N Presentation.pptx
@@ -236,7 +236,7 @@
           <a:p>
             <a:fld id="{34002523-EBD5-42F4-9DA1-0DF36BB1A508}" type="datetimeFigureOut">
               <a:rPr lang="ar-JO" smtClean="0"/>
-              <a:t>12/08/1447</a:t>
+              <a:t>15/08/1447</a:t>
             </a:fld>
             <a:endParaRPr lang="ar-JO"/>
           </a:p>
@@ -549,6 +549,129 @@
           <a:lstStyle/>
           <a:p>
             <a:r>
+              <a:rPr lang="ar-SA" dirty="0"/>
+              <a:t>(</a:t>
+            </a:r>
+            <a:r>
+              <a:rPr lang="ar-JO" dirty="0"/>
+              <a:t> </a:t>
+            </a:r>
+            <a:r>
+              <a:rPr lang="en-US" dirty="0"/>
+              <a:t>Heron of Alexandria</a:t>
+            </a:r>
+            <a:r>
+              <a:rPr lang="ar-JO" dirty="0"/>
+              <a:t> </a:t>
+            </a:r>
+            <a:r>
+              <a:rPr lang="en-US" dirty="0"/>
+              <a:t>)</a:t>
+            </a:r>
+            <a:r>
+              <a:rPr lang="ar-JO" dirty="0"/>
+              <a:t>    </a:t>
+            </a:r>
+          </a:p>
+          <a:p>
+            <a:endParaRPr lang="ar-JO" dirty="0"/>
+          </a:p>
+          <a:p>
+            <a:r>
+              <a:rPr lang="ar-SA" dirty="0"/>
+              <a:t>هيرون الإسكندري</a:t>
+            </a:r>
+            <a:r>
+              <a:rPr lang="ar-JO" dirty="0"/>
+              <a:t> </a:t>
+            </a:r>
+          </a:p>
+          <a:p>
+            <a:endParaRPr lang="en-US" dirty="0"/>
+          </a:p>
+        </p:txBody>
+      </p:sp>
+      <p:sp>
+        <p:nvSpPr>
+          <p:cNvPr id="4" name="Slide Number Placeholder 3"/>
+          <p:cNvSpPr>
+            <a:spLocks noGrp="1"/>
+          </p:cNvSpPr>
+          <p:nvPr>
+            <p:ph type="sldNum" sz="quarter" idx="5"/>
+          </p:nvPr>
+        </p:nvSpPr>
+        <p:spPr/>
+        <p:txBody>
+          <a:bodyPr/>
+          <a:lstStyle/>
+          <a:p>
+            <a:fld id="{E956323A-1177-490B-A143-E75192F7AA10}" type="slidenum">
+              <a:rPr lang="ar-JO" smtClean="0"/>
+              <a:t>4</a:t>
+            </a:fld>
+            <a:endParaRPr lang="ar-JO"/>
+          </a:p>
+        </p:txBody>
+      </p:sp>
+    </p:spTree>
+    <p:extLst>
+      <p:ext uri="{BB962C8B-B14F-4D97-AF65-F5344CB8AC3E}">
+        <p14:creationId xmlns:p14="http://schemas.microsoft.com/office/powerpoint/2010/main" val="193893260"/>
+      </p:ext>
+    </p:extLst>
+  </p:cSld>
+  <p:clrMapOvr>
+    <a:masterClrMapping/>
+  </p:clrMapOvr>
+</p:notes>
+</file>
+
+<file path=ppt/notesSlides/notesSlide2.xml><?xml version="1.0" encoding="utf-8"?>
+<p:notes xmlns:a="http://schemas.openxmlformats.org/drawingml/2006/main" xmlns:r="http://schemas.openxmlformats.org/officeDocument/2006/relationships" xmlns:p="http://schemas.openxmlformats.org/presentationml/2006/main">
+  <p:cSld>
+    <p:spTree>
+      <p:nvGrpSpPr>
+        <p:cNvPr id="1" name=""/>
+        <p:cNvGrpSpPr/>
+        <p:nvPr/>
+      </p:nvGrpSpPr>
+      <p:grpSpPr>
+        <a:xfrm>
+          <a:off x="0" y="0"/>
+          <a:ext cx="0" cy="0"/>
+          <a:chOff x="0" y="0"/>
+          <a:chExt cx="0" cy="0"/>
+        </a:xfrm>
+      </p:grpSpPr>
+      <p:sp>
+        <p:nvSpPr>
+          <p:cNvPr id="2" name="Slide Image Placeholder 1"/>
+          <p:cNvSpPr>
+            <a:spLocks noGrp="1" noRot="1" noChangeAspect="1"/>
+          </p:cNvSpPr>
+          <p:nvPr>
+            <p:ph type="sldImg"/>
+          </p:nvPr>
+        </p:nvSpPr>
+        <p:spPr/>
+      </p:sp>
+      <p:sp>
+        <p:nvSpPr>
+          <p:cNvPr id="3" name="Notes Placeholder 2"/>
+          <p:cNvSpPr>
+            <a:spLocks noGrp="1"/>
+          </p:cNvSpPr>
+          <p:nvPr>
+            <p:ph type="body" idx="1"/>
+          </p:nvPr>
+        </p:nvSpPr>
+        <p:spPr/>
+        <p:txBody>
+          <a:bodyPr/>
+          <a:lstStyle/>
+          <a:p>
+            <a:r>
               <a:rPr lang="en-US" dirty="0"/>
               <a:t>In short, n8n Cloud is the easiest, Docker is the most flexible, and VPS with EasyPanel is the best balance for real business use.</a:t>
             </a:r>
@@ -591,7 +714,7 @@
 </p:notes>
 </file>
 
-<file path=ppt/notesSlides/notesSlide2.xml><?xml version="1.0" encoding="utf-8"?>
+<file path=ppt/notesSlides/notesSlide3.xml><?xml version="1.0" encoding="utf-8"?>
 <p:notes xmlns:a="http://schemas.openxmlformats.org/drawingml/2006/main" xmlns:r="http://schemas.openxmlformats.org/officeDocument/2006/relationships" xmlns:p="http://schemas.openxmlformats.org/presentationml/2006/main">
   <p:cSld>
     <p:spTree>
@@ -699,7 +822,7 @@
 </p:notes>
 </file>
 
-<file path=ppt/notesSlides/notesSlide3.xml><?xml version="1.0" encoding="utf-8"?>
+<file path=ppt/notesSlides/notesSlide4.xml><?xml version="1.0" encoding="utf-8"?>
 <p:notes xmlns:a="http://schemas.openxmlformats.org/drawingml/2006/main" xmlns:r="http://schemas.openxmlformats.org/officeDocument/2006/relationships" xmlns:p="http://schemas.openxmlformats.org/presentationml/2006/main">
   <p:cSld>
     <p:spTree>
@@ -987,7 +1110,7 @@
             <a:fld id="{1D8BD707-D9CF-40AE-B4C6-C98DA3205C09}" type="datetimeFigureOut">
               <a:rPr lang="en-US" smtClean="0"/>
               <a:pPr/>
-              <a:t>1/30/2026</a:t>
+              <a:t>2/2/2026</a:t>
             </a:fld>
             <a:endParaRPr lang="en-US"/>
           </a:p>
@@ -1152,7 +1275,7 @@
             <a:fld id="{1D8BD707-D9CF-40AE-B4C6-C98DA3205C09}" type="datetimeFigureOut">
               <a:rPr lang="en-US" smtClean="0"/>
               <a:pPr/>
-              <a:t>1/30/2026</a:t>
+              <a:t>2/2/2026</a:t>
             </a:fld>
             <a:endParaRPr lang="en-US"/>
           </a:p>
@@ -1327,7 +1450,7 @@
             <a:fld id="{1D8BD707-D9CF-40AE-B4C6-C98DA3205C09}" type="datetimeFigureOut">
               <a:rPr lang="en-US" smtClean="0"/>
               <a:pPr/>
-              <a:t>1/30/2026</a:t>
+              <a:t>2/2/2026</a:t>
             </a:fld>
             <a:endParaRPr lang="en-US"/>
           </a:p>
@@ -1492,7 +1615,7 @@
             <a:fld id="{1D8BD707-D9CF-40AE-B4C6-C98DA3205C09}" type="datetimeFigureOut">
               <a:rPr lang="en-US" smtClean="0"/>
               <a:pPr/>
-              <a:t>1/30/2026</a:t>
+              <a:t>2/2/2026</a:t>
             </a:fld>
             <a:endParaRPr lang="en-US"/>
           </a:p>
@@ -1734,7 +1857,7 @@
             <a:fld id="{1D8BD707-D9CF-40AE-B4C6-C98DA3205C09}" type="datetimeFigureOut">
               <a:rPr lang="en-US" smtClean="0"/>
               <a:pPr/>
-              <a:t>1/30/2026</a:t>
+              <a:t>2/2/2026</a:t>
             </a:fld>
             <a:endParaRPr lang="en-US"/>
           </a:p>
@@ -2016,7 +2139,7 @@
             <a:fld id="{1D8BD707-D9CF-40AE-B4C6-C98DA3205C09}" type="datetimeFigureOut">
               <a:rPr lang="en-US" smtClean="0"/>
               <a:pPr/>
-              <a:t>1/30/2026</a:t>
+              <a:t>2/2/2026</a:t>
             </a:fld>
             <a:endParaRPr lang="en-US"/>
           </a:p>
@@ -2432,7 +2555,7 @@
             <a:fld id="{1D8BD707-D9CF-40AE-B4C6-C98DA3205C09}" type="datetimeFigureOut">
               <a:rPr lang="en-US" smtClean="0"/>
               <a:pPr/>
-              <a:t>1/30/2026</a:t>
+              <a:t>2/2/2026</a:t>
             </a:fld>
             <a:endParaRPr lang="en-US"/>
           </a:p>
@@ -2546,7 +2669,7 @@
             <a:fld id="{1D8BD707-D9CF-40AE-B4C6-C98DA3205C09}" type="datetimeFigureOut">
               <a:rPr lang="en-US" smtClean="0"/>
               <a:pPr/>
-              <a:t>1/30/2026</a:t>
+              <a:t>2/2/2026</a:t>
             </a:fld>
             <a:endParaRPr lang="en-US"/>
           </a:p>
@@ -2638,7 +2761,7 @@
             <a:fld id="{1D8BD707-D9CF-40AE-B4C6-C98DA3205C09}" type="datetimeFigureOut">
               <a:rPr lang="en-US" smtClean="0"/>
               <a:pPr/>
-              <a:t>1/30/2026</a:t>
+              <a:t>2/2/2026</a:t>
             </a:fld>
             <a:endParaRPr lang="en-US"/>
           </a:p>
@@ -2910,7 +3033,7 @@
             <a:fld id="{1D8BD707-D9CF-40AE-B4C6-C98DA3205C09}" type="datetimeFigureOut">
               <a:rPr lang="en-US" smtClean="0"/>
               <a:pPr/>
-              <a:t>1/30/2026</a:t>
+              <a:t>2/2/2026</a:t>
             </a:fld>
             <a:endParaRPr lang="en-US"/>
           </a:p>
@@ -3159,7 +3282,7 @@
             <a:fld id="{1D8BD707-D9CF-40AE-B4C6-C98DA3205C09}" type="datetimeFigureOut">
               <a:rPr lang="en-US" smtClean="0"/>
               <a:pPr/>
-              <a:t>1/30/2026</a:t>
+              <a:t>2/2/2026</a:t>
             </a:fld>
             <a:endParaRPr lang="en-US"/>
           </a:p>
@@ -3367,7 +3490,7 @@
             <a:fld id="{1D8BD707-D9CF-40AE-B4C6-C98DA3205C09}" type="datetimeFigureOut">
               <a:rPr lang="en-US" smtClean="0"/>
               <a:pPr/>
-              <a:t>1/30/2026</a:t>
+              <a:t>2/2/2026</a:t>
             </a:fld>
             <a:endParaRPr lang="en-US"/>
           </a:p>
@@ -4724,13 +4847,13 @@
   <p:clrMapOvr>
     <a:masterClrMapping/>
   </p:clrMapOvr>
-  <mc:AlternateContent xmlns:mc="http://schemas.openxmlformats.org/markup-compatibility/2006">
-    <mc:Choice xmlns:p159="http://schemas.microsoft.com/office/powerpoint/2015/09/main" Requires="p159">
+  <mc:AlternateContent xmlns:mc="http://schemas.openxmlformats.org/markup-compatibility/2006" xmlns:p159="http://schemas.microsoft.com/office/powerpoint/2015/09/main">
+    <mc:Choice Requires="p159">
       <p:transition xmlns:p14="http://schemas.microsoft.com/office/powerpoint/2010/main" spd="slow" p14:dur="2000">
         <p159:morph option="byObject"/>
       </p:transition>
     </mc:Choice>
-    <mc:Fallback>
+    <mc:Fallback xmlns="">
       <p:transition spd="slow">
         <p:fade/>
       </p:transition>
@@ -5528,13 +5651,13 @@
   <p:clrMapOvr>
     <a:masterClrMapping/>
   </p:clrMapOvr>
-  <mc:AlternateContent xmlns:mc="http://schemas.openxmlformats.org/markup-compatibility/2006">
-    <mc:Choice xmlns:p159="http://schemas.microsoft.com/office/powerpoint/2015/09/main" Requires="p159">
+  <mc:AlternateContent xmlns:mc="http://schemas.openxmlformats.org/markup-compatibility/2006" xmlns:p159="http://schemas.microsoft.com/office/powerpoint/2015/09/main">
+    <mc:Choice Requires="p159">
       <p:transition xmlns:p14="http://schemas.microsoft.com/office/powerpoint/2010/main" spd="slow" p14:dur="2000">
         <p159:morph option="byObject"/>
       </p:transition>
     </mc:Choice>
-    <mc:Fallback>
+    <mc:Fallback xmlns="">
       <p:transition spd="slow">
         <p:fade/>
       </p:transition>
@@ -6224,13 +6347,13 @@
   <p:clrMapOvr>
     <a:masterClrMapping/>
   </p:clrMapOvr>
-  <mc:AlternateContent xmlns:mc="http://schemas.openxmlformats.org/markup-compatibility/2006">
-    <mc:Choice xmlns:p159="http://schemas.microsoft.com/office/powerpoint/2015/09/main" Requires="p159">
+  <mc:AlternateContent xmlns:mc="http://schemas.openxmlformats.org/markup-compatibility/2006" xmlns:p159="http://schemas.microsoft.com/office/powerpoint/2015/09/main">
+    <mc:Choice Requires="p159">
       <p:transition xmlns:p14="http://schemas.microsoft.com/office/powerpoint/2010/main" spd="slow" p14:dur="2000">
         <p159:morph option="byObject"/>
       </p:transition>
     </mc:Choice>
-    <mc:Fallback>
+    <mc:Fallback xmlns="">
       <p:transition spd="slow">
         <p:fade/>
       </p:transition>
@@ -6917,13 +7040,13 @@
   <p:clrMapOvr>
     <a:masterClrMapping/>
   </p:clrMapOvr>
-  <mc:AlternateContent xmlns:mc="http://schemas.openxmlformats.org/markup-compatibility/2006">
-    <mc:Choice xmlns:p159="http://schemas.microsoft.com/office/powerpoint/2015/09/main" Requires="p159">
+  <mc:AlternateContent xmlns:mc="http://schemas.openxmlformats.org/markup-compatibility/2006" xmlns:p159="http://schemas.microsoft.com/office/powerpoint/2015/09/main">
+    <mc:Choice Requires="p159">
       <p:transition xmlns:p14="http://schemas.microsoft.com/office/powerpoint/2010/main" spd="slow" p14:dur="2000">
         <p159:morph option="byObject"/>
       </p:transition>
     </mc:Choice>
-    <mc:Fallback>
+    <mc:Fallback xmlns="">
       <p:transition spd="slow">
         <p:fade/>
       </p:transition>
@@ -7732,13 +7855,13 @@
   <p:clrMapOvr>
     <a:masterClrMapping/>
   </p:clrMapOvr>
-  <mc:AlternateContent xmlns:mc="http://schemas.openxmlformats.org/markup-compatibility/2006">
-    <mc:Choice xmlns:p159="http://schemas.microsoft.com/office/powerpoint/2015/09/main" Requires="p159">
+  <mc:AlternateContent xmlns:mc="http://schemas.openxmlformats.org/markup-compatibility/2006" xmlns:p159="http://schemas.microsoft.com/office/powerpoint/2015/09/main">
+    <mc:Choice Requires="p159">
       <p:transition xmlns:p14="http://schemas.microsoft.com/office/powerpoint/2010/main" spd="slow" p14:dur="2000">
         <p159:morph option="byObject"/>
       </p:transition>
     </mc:Choice>
-    <mc:Fallback>
+    <mc:Fallback xmlns="">
       <p:transition spd="slow">
         <p:fade/>
       </p:transition>
@@ -8386,13 +8509,13 @@
   <p:clrMapOvr>
     <a:masterClrMapping/>
   </p:clrMapOvr>
-  <mc:AlternateContent xmlns:mc="http://schemas.openxmlformats.org/markup-compatibility/2006">
-    <mc:Choice xmlns:p159="http://schemas.microsoft.com/office/powerpoint/2015/09/main" Requires="p159">
+  <mc:AlternateContent xmlns:mc="http://schemas.openxmlformats.org/markup-compatibility/2006" xmlns:p159="http://schemas.microsoft.com/office/powerpoint/2015/09/main">
+    <mc:Choice Requires="p159">
       <p:transition xmlns:p14="http://schemas.microsoft.com/office/powerpoint/2010/main" spd="slow" p14:dur="2000">
         <p159:morph option="byObject"/>
       </p:transition>
     </mc:Choice>
-    <mc:Fallback>
+    <mc:Fallback xmlns="">
       <p:transition spd="slow">
         <p:fade/>
       </p:transition>
@@ -9146,13 +9269,13 @@
   <p:clrMapOvr>
     <a:masterClrMapping/>
   </p:clrMapOvr>
-  <mc:AlternateContent xmlns:mc="http://schemas.openxmlformats.org/markup-compatibility/2006">
-    <mc:Choice xmlns:p159="http://schemas.microsoft.com/office/powerpoint/2015/09/main" Requires="p159">
+  <mc:AlternateContent xmlns:mc="http://schemas.openxmlformats.org/markup-compatibility/2006" xmlns:p159="http://schemas.microsoft.com/office/powerpoint/2015/09/main">
+    <mc:Choice Requires="p159">
       <p:transition xmlns:p14="http://schemas.microsoft.com/office/powerpoint/2010/main" spd="slow" p14:dur="2000">
         <p159:morph option="byObject"/>
       </p:transition>
     </mc:Choice>
-    <mc:Fallback>
+    <mc:Fallback xmlns="">
       <p:transition spd="slow">
         <p:fade/>
       </p:transition>
@@ -9864,13 +9987,13 @@
   <p:clrMapOvr>
     <a:masterClrMapping/>
   </p:clrMapOvr>
-  <mc:AlternateContent xmlns:mc="http://schemas.openxmlformats.org/markup-compatibility/2006">
-    <mc:Choice xmlns:p159="http://schemas.microsoft.com/office/powerpoint/2015/09/main" Requires="p159">
+  <mc:AlternateContent xmlns:mc="http://schemas.openxmlformats.org/markup-compatibility/2006" xmlns:p159="http://schemas.microsoft.com/office/powerpoint/2015/09/main">
+    <mc:Choice Requires="p159">
       <p:transition xmlns:p14="http://schemas.microsoft.com/office/powerpoint/2010/main" spd="slow" p14:dur="2000">
         <p159:morph option="byObject"/>
       </p:transition>
     </mc:Choice>
-    <mc:Fallback>
+    <mc:Fallback xmlns="">
       <p:transition spd="slow">
         <p:fade/>
       </p:transition>
@@ -10633,13 +10756,13 @@
   <p:clrMapOvr>
     <a:masterClrMapping/>
   </p:clrMapOvr>
-  <mc:AlternateContent xmlns:mc="http://schemas.openxmlformats.org/markup-compatibility/2006">
-    <mc:Choice xmlns:p159="http://schemas.microsoft.com/office/powerpoint/2015/09/main" Requires="p159">
+  <mc:AlternateContent xmlns:mc="http://schemas.openxmlformats.org/markup-compatibility/2006" xmlns:p159="http://schemas.microsoft.com/office/powerpoint/2015/09/main">
+    <mc:Choice Requires="p159">
       <p:transition xmlns:p14="http://schemas.microsoft.com/office/powerpoint/2010/main" spd="slow" p14:dur="2000">
         <p159:morph option="byObject"/>
       </p:transition>
     </mc:Choice>
-    <mc:Fallback>
+    <mc:Fallback xmlns="">
       <p:transition spd="slow">
         <p:fade/>
       </p:transition>
@@ -11428,13 +11551,13 @@
   <p:clrMapOvr>
     <a:masterClrMapping/>
   </p:clrMapOvr>
-  <mc:AlternateContent xmlns:mc="http://schemas.openxmlformats.org/markup-compatibility/2006">
-    <mc:Choice xmlns:p159="http://schemas.microsoft.com/office/powerpoint/2015/09/main" Requires="p159">
+  <mc:AlternateContent xmlns:mc="http://schemas.openxmlformats.org/markup-compatibility/2006" xmlns:p159="http://schemas.microsoft.com/office/powerpoint/2015/09/main">
+    <mc:Choice Requires="p159">
       <p:transition xmlns:p14="http://schemas.microsoft.com/office/powerpoint/2010/main" spd="slow" p14:dur="2000">
         <p159:morph option="byObject"/>
       </p:transition>
     </mc:Choice>
-    <mc:Fallback>
+    <mc:Fallback xmlns="">
       <p:transition spd="slow">
         <p:fade/>
       </p:transition>
@@ -12047,13 +12170,13 @@
   <p:clrMapOvr>
     <a:masterClrMapping/>
   </p:clrMapOvr>
-  <mc:AlternateContent xmlns:mc="http://schemas.openxmlformats.org/markup-compatibility/2006">
-    <mc:Choice xmlns:p159="http://schemas.microsoft.com/office/powerpoint/2015/09/main" Requires="p159">
+  <mc:AlternateContent xmlns:mc="http://schemas.openxmlformats.org/markup-compatibility/2006" xmlns:p159="http://schemas.microsoft.com/office/powerpoint/2015/09/main">
+    <mc:Choice Requires="p159">
       <p:transition xmlns:p14="http://schemas.microsoft.com/office/powerpoint/2010/main" spd="slow" p14:dur="2000">
         <p159:morph option="byObject"/>
       </p:transition>
     </mc:Choice>
-    <mc:Fallback>
+    <mc:Fallback xmlns="">
       <p:transition spd="slow">
         <p:fade/>
       </p:transition>
@@ -12754,13 +12877,13 @@
   <p:clrMapOvr>
     <a:masterClrMapping/>
   </p:clrMapOvr>
-  <mc:AlternateContent xmlns:mc="http://schemas.openxmlformats.org/markup-compatibility/2006">
-    <mc:Choice xmlns:p159="http://schemas.microsoft.com/office/powerpoint/2015/09/main" Requires="p159">
+  <mc:AlternateContent xmlns:mc="http://schemas.openxmlformats.org/markup-compatibility/2006" xmlns:p159="http://schemas.microsoft.com/office/powerpoint/2015/09/main">
+    <mc:Choice Requires="p159">
       <p:transition xmlns:p14="http://schemas.microsoft.com/office/powerpoint/2010/main" spd="slow" p14:dur="2000">
         <p159:morph option="byObject"/>
       </p:transition>
     </mc:Choice>
-    <mc:Fallback>
+    <mc:Fallback xmlns="">
       <p:transition spd="slow">
         <p:fade/>
       </p:transition>
@@ -12955,10 +13078,10 @@
             </a:pathLst>
           </a:custGeom>
           <a:blipFill>
-            <a:blip r:embed="rId2">
+            <a:blip r:embed="rId3">
               <a:extLst>
                 <a:ext uri="{96DAC541-7B7A-43D3-8B79-37D633B846F1}">
-                  <asvg:svgBlip xmlns:asvg="http://schemas.microsoft.com/office/drawing/2016/SVG/main" r:embed="rId3"/>
+                  <asvg:svgBlip xmlns:asvg="http://schemas.microsoft.com/office/drawing/2016/SVG/main" r:embed="rId4"/>
                 </a:ext>
               </a:extLst>
             </a:blip>
@@ -13020,10 +13143,10 @@
             </a:pathLst>
           </a:custGeom>
           <a:blipFill>
-            <a:blip r:embed="rId2">
+            <a:blip r:embed="rId3">
               <a:extLst>
                 <a:ext uri="{96DAC541-7B7A-43D3-8B79-37D633B846F1}">
-                  <asvg:svgBlip xmlns:asvg="http://schemas.microsoft.com/office/drawing/2016/SVG/main" r:embed="rId3"/>
+                  <asvg:svgBlip xmlns:asvg="http://schemas.microsoft.com/office/drawing/2016/SVG/main" r:embed="rId4"/>
                 </a:ext>
               </a:extLst>
             </a:blip>
@@ -13085,10 +13208,10 @@
             </a:pathLst>
           </a:custGeom>
           <a:blipFill>
-            <a:blip r:embed="rId4">
+            <a:blip r:embed="rId5">
               <a:extLst>
                 <a:ext uri="{96DAC541-7B7A-43D3-8B79-37D633B846F1}">
-                  <asvg:svgBlip xmlns:asvg="http://schemas.microsoft.com/office/drawing/2016/SVG/main" r:embed="rId5"/>
+                  <asvg:svgBlip xmlns:asvg="http://schemas.microsoft.com/office/drawing/2016/SVG/main" r:embed="rId6"/>
                 </a:ext>
               </a:extLst>
             </a:blip>
@@ -13150,10 +13273,10 @@
             </a:pathLst>
           </a:custGeom>
           <a:blipFill>
-            <a:blip r:embed="rId4">
+            <a:blip r:embed="rId5">
               <a:extLst>
                 <a:ext uri="{96DAC541-7B7A-43D3-8B79-37D633B846F1}">
-                  <asvg:svgBlip xmlns:asvg="http://schemas.microsoft.com/office/drawing/2016/SVG/main" r:embed="rId5"/>
+                  <asvg:svgBlip xmlns:asvg="http://schemas.microsoft.com/office/drawing/2016/SVG/main" r:embed="rId6"/>
                 </a:ext>
               </a:extLst>
             </a:blip>
@@ -13412,13 +13535,13 @@
   <p:clrMapOvr>
     <a:masterClrMapping/>
   </p:clrMapOvr>
-  <mc:AlternateContent xmlns:mc="http://schemas.openxmlformats.org/markup-compatibility/2006">
-    <mc:Choice xmlns:p159="http://schemas.microsoft.com/office/powerpoint/2015/09/main" Requires="p159">
+  <mc:AlternateContent xmlns:mc="http://schemas.openxmlformats.org/markup-compatibility/2006" xmlns:p159="http://schemas.microsoft.com/office/powerpoint/2015/09/main">
+    <mc:Choice Requires="p159">
       <p:transition xmlns:p14="http://schemas.microsoft.com/office/powerpoint/2010/main" spd="slow" p14:dur="2000">
         <p159:morph option="byObject"/>
       </p:transition>
     </mc:Choice>
-    <mc:Fallback>
+    <mc:Fallback xmlns="">
       <p:transition spd="slow">
         <p:fade/>
       </p:transition>
@@ -14134,13 +14257,13 @@
   <p:clrMapOvr>
     <a:masterClrMapping/>
   </p:clrMapOvr>
-  <mc:AlternateContent xmlns:mc="http://schemas.openxmlformats.org/markup-compatibility/2006">
-    <mc:Choice xmlns:p159="http://schemas.microsoft.com/office/powerpoint/2015/09/main" Requires="p159">
+  <mc:AlternateContent xmlns:mc="http://schemas.openxmlformats.org/markup-compatibility/2006" xmlns:p159="http://schemas.microsoft.com/office/powerpoint/2015/09/main">
+    <mc:Choice Requires="p159">
       <p:transition xmlns:p14="http://schemas.microsoft.com/office/powerpoint/2010/main" spd="slow" p14:dur="2000">
         <p159:morph option="byObject"/>
       </p:transition>
     </mc:Choice>
-    <mc:Fallback>
+    <mc:Fallback xmlns="">
       <p:transition spd="slow">
         <p:fade/>
       </p:transition>
@@ -14789,13 +14912,13 @@
   <p:clrMapOvr>
     <a:masterClrMapping/>
   </p:clrMapOvr>
-  <mc:AlternateContent xmlns:mc="http://schemas.openxmlformats.org/markup-compatibility/2006">
-    <mc:Choice xmlns:p159="http://schemas.microsoft.com/office/powerpoint/2015/09/main" Requires="p159">
+  <mc:AlternateContent xmlns:mc="http://schemas.openxmlformats.org/markup-compatibility/2006" xmlns:p159="http://schemas.microsoft.com/office/powerpoint/2015/09/main">
+    <mc:Choice Requires="p159">
       <p:transition xmlns:p14="http://schemas.microsoft.com/office/powerpoint/2010/main" spd="slow" p14:dur="2000">
         <p159:morph option="byObject"/>
       </p:transition>
     </mc:Choice>
-    <mc:Fallback>
+    <mc:Fallback xmlns="">
       <p:transition spd="slow">
         <p:fade/>
       </p:transition>
@@ -15472,13 +15595,13 @@
   <p:clrMapOvr>
     <a:masterClrMapping/>
   </p:clrMapOvr>
-  <mc:AlternateContent xmlns:mc="http://schemas.openxmlformats.org/markup-compatibility/2006">
-    <mc:Choice xmlns:p159="http://schemas.microsoft.com/office/powerpoint/2015/09/main" Requires="p159">
+  <mc:AlternateContent xmlns:mc="http://schemas.openxmlformats.org/markup-compatibility/2006" xmlns:p159="http://schemas.microsoft.com/office/powerpoint/2015/09/main">
+    <mc:Choice Requires="p159">
       <p:transition xmlns:p14="http://schemas.microsoft.com/office/powerpoint/2010/main" spd="slow" p14:dur="2000">
         <p159:morph option="byObject"/>
       </p:transition>
     </mc:Choice>
-    <mc:Fallback>
+    <mc:Fallback xmlns="">
       <p:transition spd="slow">
         <p:fade/>
       </p:transition>
@@ -16165,6 +16288,15 @@
             <a:r>
               <a:rPr lang="en-US" sz="3600" dirty="0">
                 <a:solidFill>
+                  <a:schemeClr val="accent6"/>
+                </a:solidFill>
+                <a:latin typeface="Franklin Gothic Book" panose="020B0503020102020204" pitchFamily="34" charset="0"/>
+              </a:rPr>
+              <a:t>• </a:t>
+            </a:r>
+            <a:r>
+              <a:rPr lang="en-US" sz="3600" dirty="0">
+                <a:solidFill>
                   <a:schemeClr val="accent6">
                     <a:lumMod val="20000"/>
                     <a:lumOff val="80000"/>
@@ -16172,28 +16304,7 @@
                 </a:solidFill>
                 <a:latin typeface="Franklin Gothic Book" panose="020B0503020102020204" pitchFamily="34" charset="0"/>
               </a:rPr>
-              <a:t>It is good for medium complexity automations but still has limits when you need deep </a:t>
-            </a:r>
-            <a:r>
-              <a:rPr lang="en-US" sz="3600" dirty="0">
-                <a:solidFill>
-                  <a:schemeClr val="accent6"/>
-                </a:solidFill>
-                <a:latin typeface="Franklin Gothic Book" panose="020B0503020102020204" pitchFamily="34" charset="0"/>
-              </a:rPr>
-              <a:t>• </a:t>
-            </a:r>
-            <a:r>
-              <a:rPr lang="en-US" sz="3600" dirty="0">
-                <a:solidFill>
-                  <a:schemeClr val="accent6">
-                    <a:lumMod val="20000"/>
-                    <a:lumOff val="80000"/>
-                  </a:schemeClr>
-                </a:solidFill>
-                <a:latin typeface="Franklin Gothic Book" panose="020B0503020102020204" pitchFamily="34" charset="0"/>
-              </a:rPr>
-              <a:t>customization or advanced logic.</a:t>
+              <a:t>It is good for medium complexity automations but still has limits when you need deep customization or advanced logic.</a:t>
             </a:r>
           </a:p>
           <a:p>
@@ -16274,13 +16385,13 @@
   <p:clrMapOvr>
     <a:masterClrMapping/>
   </p:clrMapOvr>
-  <mc:AlternateContent xmlns:mc="http://schemas.openxmlformats.org/markup-compatibility/2006">
-    <mc:Choice xmlns:p159="http://schemas.microsoft.com/office/powerpoint/2015/09/main" Requires="p159">
+  <mc:AlternateContent xmlns:mc="http://schemas.openxmlformats.org/markup-compatibility/2006" xmlns:p159="http://schemas.microsoft.com/office/powerpoint/2015/09/main">
+    <mc:Choice Requires="p159">
       <p:transition xmlns:p14="http://schemas.microsoft.com/office/powerpoint/2010/main" spd="slow" p14:dur="2000">
         <p159:morph option="byObject"/>
       </p:transition>
     </mc:Choice>
-    <mc:Fallback>
+    <mc:Fallback xmlns="">
       <p:transition spd="slow">
         <p:fade/>
       </p:transition>
@@ -16959,7 +17070,30 @@
                 </a:solidFill>
                 <a:latin typeface="Franklin Gothic Book" panose="020B0503020102020204" pitchFamily="34" charset="0"/>
               </a:rPr>
-              <a:t>And Guess What APIs Is All We WANT!!!!!</a:t>
+              <a:t>And Guess What </a:t>
+            </a:r>
+            <a:r>
+              <a:rPr lang="en-US" sz="6600" b="1" dirty="0">
+                <a:solidFill>
+                  <a:schemeClr val="accent6">
+                    <a:lumMod val="75000"/>
+                  </a:schemeClr>
+                </a:solidFill>
+                <a:latin typeface="Franklin Gothic Book" panose="020B0503020102020204" pitchFamily="34" charset="0"/>
+              </a:rPr>
+              <a:t>APIs</a:t>
+            </a:r>
+            <a:r>
+              <a:rPr lang="en-US" sz="6600" b="1" dirty="0">
+                <a:solidFill>
+                  <a:schemeClr val="accent6">
+                    <a:lumMod val="20000"/>
+                    <a:lumOff val="80000"/>
+                  </a:schemeClr>
+                </a:solidFill>
+                <a:latin typeface="Franklin Gothic Book" panose="020B0503020102020204" pitchFamily="34" charset="0"/>
+              </a:rPr>
+              <a:t> Is All We WANT!!!!!</a:t>
             </a:r>
           </a:p>
           <a:p>
@@ -16985,13 +17119,13 @@
   <p:clrMapOvr>
     <a:masterClrMapping/>
   </p:clrMapOvr>
-  <mc:AlternateContent xmlns:mc="http://schemas.openxmlformats.org/markup-compatibility/2006">
-    <mc:Choice xmlns:p159="http://schemas.microsoft.com/office/powerpoint/2015/09/main" Requires="p159">
+  <mc:AlternateContent xmlns:mc="http://schemas.openxmlformats.org/markup-compatibility/2006" xmlns:p159="http://schemas.microsoft.com/office/powerpoint/2015/09/main">
+    <mc:Choice Requires="p159">
       <p:transition xmlns:p14="http://schemas.microsoft.com/office/powerpoint/2010/main" spd="slow" p14:dur="2000">
         <p159:morph option="byObject"/>
       </p:transition>
     </mc:Choice>
-    <mc:Fallback>
+    <mc:Fallback xmlns="">
       <p:transition spd="slow">
         <p:fade/>
       </p:transition>

</xml_diff>